<commit_message>
Started on chapters 9 and 10
</commit_message>
<xml_diff>
--- a/Chapter09-SpatialStatistics/Chapter9.pptx
+++ b/Chapter09-SpatialStatistics/Chapter9.pptx
@@ -104,6 +104,11 @@
       </a:defRPr>
     </a:lvl9pPr>
   </p:defaultTextStyle>
+  <p:extLst>
+    <p:ext uri="{EFAFB233-063F-42B5-8137-9DF3F51BA10A}">
+      <p15:sldGuideLst xmlns:p15="http://schemas.microsoft.com/office/powerpoint/2012/main"/>
+    </p:ext>
+  </p:extLst>
 </p:presentation>
 </file>
 
@@ -254,7 +259,7 @@
           <a:p>
             <a:fld id="{53326AB7-C146-8643-AC32-1D896C71A7F3}" type="datetimeFigureOut">
               <a:rPr lang="en-US" smtClean="0"/>
-              <a:t>7/16/18</a:t>
+              <a:t>7/21/18</a:t>
             </a:fld>
             <a:endParaRPr lang="en-US"/>
           </a:p>
@@ -452,7 +457,7 @@
           <a:p>
             <a:fld id="{53326AB7-C146-8643-AC32-1D896C71A7F3}" type="datetimeFigureOut">
               <a:rPr lang="en-US" smtClean="0"/>
-              <a:t>7/16/18</a:t>
+              <a:t>7/21/18</a:t>
             </a:fld>
             <a:endParaRPr lang="en-US"/>
           </a:p>
@@ -660,7 +665,7 @@
           <a:p>
             <a:fld id="{53326AB7-C146-8643-AC32-1D896C71A7F3}" type="datetimeFigureOut">
               <a:rPr lang="en-US" smtClean="0"/>
-              <a:t>7/16/18</a:t>
+              <a:t>7/21/18</a:t>
             </a:fld>
             <a:endParaRPr lang="en-US"/>
           </a:p>
@@ -858,7 +863,7 @@
           <a:p>
             <a:fld id="{53326AB7-C146-8643-AC32-1D896C71A7F3}" type="datetimeFigureOut">
               <a:rPr lang="en-US" smtClean="0"/>
-              <a:t>7/16/18</a:t>
+              <a:t>7/21/18</a:t>
             </a:fld>
             <a:endParaRPr lang="en-US"/>
           </a:p>
@@ -1133,7 +1138,7 @@
           <a:p>
             <a:fld id="{53326AB7-C146-8643-AC32-1D896C71A7F3}" type="datetimeFigureOut">
               <a:rPr lang="en-US" smtClean="0"/>
-              <a:t>7/16/18</a:t>
+              <a:t>7/21/18</a:t>
             </a:fld>
             <a:endParaRPr lang="en-US"/>
           </a:p>
@@ -1398,7 +1403,7 @@
           <a:p>
             <a:fld id="{53326AB7-C146-8643-AC32-1D896C71A7F3}" type="datetimeFigureOut">
               <a:rPr lang="en-US" smtClean="0"/>
-              <a:t>7/16/18</a:t>
+              <a:t>7/21/18</a:t>
             </a:fld>
             <a:endParaRPr lang="en-US"/>
           </a:p>
@@ -1810,7 +1815,7 @@
           <a:p>
             <a:fld id="{53326AB7-C146-8643-AC32-1D896C71A7F3}" type="datetimeFigureOut">
               <a:rPr lang="en-US" smtClean="0"/>
-              <a:t>7/16/18</a:t>
+              <a:t>7/21/18</a:t>
             </a:fld>
             <a:endParaRPr lang="en-US"/>
           </a:p>
@@ -1951,7 +1956,7 @@
           <a:p>
             <a:fld id="{53326AB7-C146-8643-AC32-1D896C71A7F3}" type="datetimeFigureOut">
               <a:rPr lang="en-US" smtClean="0"/>
-              <a:t>7/16/18</a:t>
+              <a:t>7/21/18</a:t>
             </a:fld>
             <a:endParaRPr lang="en-US"/>
           </a:p>
@@ -2064,7 +2069,7 @@
           <a:p>
             <a:fld id="{53326AB7-C146-8643-AC32-1D896C71A7F3}" type="datetimeFigureOut">
               <a:rPr lang="en-US" smtClean="0"/>
-              <a:t>7/16/18</a:t>
+              <a:t>7/21/18</a:t>
             </a:fld>
             <a:endParaRPr lang="en-US"/>
           </a:p>
@@ -2375,7 +2380,7 @@
           <a:p>
             <a:fld id="{53326AB7-C146-8643-AC32-1D896C71A7F3}" type="datetimeFigureOut">
               <a:rPr lang="en-US" smtClean="0"/>
-              <a:t>7/16/18</a:t>
+              <a:t>7/21/18</a:t>
             </a:fld>
             <a:endParaRPr lang="en-US"/>
           </a:p>
@@ -2663,7 +2668,7 @@
           <a:p>
             <a:fld id="{53326AB7-C146-8643-AC32-1D896C71A7F3}" type="datetimeFigureOut">
               <a:rPr lang="en-US" smtClean="0"/>
-              <a:t>7/16/18</a:t>
+              <a:t>7/21/18</a:t>
             </a:fld>
             <a:endParaRPr lang="en-US"/>
           </a:p>
@@ -2904,7 +2909,7 @@
           <a:p>
             <a:fld id="{53326AB7-C146-8643-AC32-1D896C71A7F3}" type="datetimeFigureOut">
               <a:rPr lang="en-US" smtClean="0"/>
-              <a:t>7/16/18</a:t>
+              <a:t>7/21/18</a:t>
             </a:fld>
             <a:endParaRPr lang="en-US"/>
           </a:p>
@@ -3342,7 +3347,10 @@
           <a:bodyPr/>
           <a:lstStyle/>
           <a:p>
-            <a:endParaRPr lang="en-US"/>
+            <a:r>
+              <a:rPr lang="en-US" dirty="0"/>
+              <a:t>Chapter 9</a:t>
+            </a:r>
           </a:p>
         </p:txBody>
       </p:sp>
@@ -3367,7 +3375,10 @@
           <a:bodyPr/>
           <a:lstStyle/>
           <a:p>
-            <a:endParaRPr lang="en-US"/>
+            <a:r>
+              <a:rPr lang="en-US"/>
+              <a:t>Spatial Statistics</a:t>
+            </a:r>
           </a:p>
         </p:txBody>
       </p:sp>

</xml_diff>

<commit_message>
adding new files etc. for Chapter 9 spatial statistics
</commit_message>
<xml_diff>
--- a/Chapter09-SpatialStatistics/Chapter9.pptx
+++ b/Chapter09-SpatialStatistics/Chapter9.pptx
@@ -4,8 +4,12 @@
   <p:sldMasterIdLst>
     <p:sldMasterId id="2147483648" r:id="rId1"/>
   </p:sldMasterIdLst>
+  <p:notesMasterIdLst>
+    <p:notesMasterId r:id="rId4"/>
+  </p:notesMasterIdLst>
   <p:sldIdLst>
     <p:sldId id="256" r:id="rId2"/>
+    <p:sldId id="278" r:id="rId3"/>
   </p:sldIdLst>
   <p:sldSz cx="12192000" cy="6858000"/>
   <p:notesSz cx="6858000" cy="9144000"/>
@@ -112,6 +116,453 @@
 </p:presentation>
 </file>
 
+<file path=ppt/notesMasters/notesMaster1.xml><?xml version="1.0" encoding="utf-8"?>
+<p:notesMaster xmlns:a="http://schemas.openxmlformats.org/drawingml/2006/main" xmlns:r="http://schemas.openxmlformats.org/officeDocument/2006/relationships" xmlns:p="http://schemas.openxmlformats.org/presentationml/2006/main">
+  <p:cSld>
+    <p:bg>
+      <p:bgRef idx="1001">
+        <a:schemeClr val="bg1"/>
+      </p:bgRef>
+    </p:bg>
+    <p:spTree>
+      <p:nvGrpSpPr>
+        <p:cNvPr id="1" name=""/>
+        <p:cNvGrpSpPr/>
+        <p:nvPr/>
+      </p:nvGrpSpPr>
+      <p:grpSpPr>
+        <a:xfrm>
+          <a:off x="0" y="0"/>
+          <a:ext cx="0" cy="0"/>
+          <a:chOff x="0" y="0"/>
+          <a:chExt cx="0" cy="0"/>
+        </a:xfrm>
+      </p:grpSpPr>
+      <p:sp>
+        <p:nvSpPr>
+          <p:cNvPr id="2" name="Header Placeholder 1"/>
+          <p:cNvSpPr>
+            <a:spLocks noGrp="1"/>
+          </p:cNvSpPr>
+          <p:nvPr>
+            <p:ph type="hdr" sz="quarter"/>
+          </p:nvPr>
+        </p:nvSpPr>
+        <p:spPr>
+          <a:xfrm>
+            <a:off x="0" y="0"/>
+            <a:ext cx="2971800" cy="458788"/>
+          </a:xfrm>
+          <a:prstGeom prst="rect">
+            <a:avLst/>
+          </a:prstGeom>
+        </p:spPr>
+        <p:txBody>
+          <a:bodyPr vert="horz" lIns="91440" tIns="45720" rIns="91440" bIns="45720" rtlCol="0"/>
+          <a:lstStyle>
+            <a:lvl1pPr algn="l">
+              <a:defRPr sz="1200"/>
+            </a:lvl1pPr>
+          </a:lstStyle>
+          <a:p>
+            <a:endParaRPr lang="en-US"/>
+          </a:p>
+        </p:txBody>
+      </p:sp>
+      <p:sp>
+        <p:nvSpPr>
+          <p:cNvPr id="3" name="Date Placeholder 2"/>
+          <p:cNvSpPr>
+            <a:spLocks noGrp="1"/>
+          </p:cNvSpPr>
+          <p:nvPr>
+            <p:ph type="dt" idx="1"/>
+          </p:nvPr>
+        </p:nvSpPr>
+        <p:spPr>
+          <a:xfrm>
+            <a:off x="3884613" y="0"/>
+            <a:ext cx="2971800" cy="458788"/>
+          </a:xfrm>
+          <a:prstGeom prst="rect">
+            <a:avLst/>
+          </a:prstGeom>
+        </p:spPr>
+        <p:txBody>
+          <a:bodyPr vert="horz" lIns="91440" tIns="45720" rIns="91440" bIns="45720" rtlCol="0"/>
+          <a:lstStyle>
+            <a:lvl1pPr algn="r">
+              <a:defRPr sz="1200"/>
+            </a:lvl1pPr>
+          </a:lstStyle>
+          <a:p>
+            <a:fld id="{277BE31A-CF47-1542-834B-3F84EFC65F53}" type="datetimeFigureOut">
+              <a:rPr lang="en-US" smtClean="0"/>
+              <a:t>7/23/18</a:t>
+            </a:fld>
+            <a:endParaRPr lang="en-US"/>
+          </a:p>
+        </p:txBody>
+      </p:sp>
+      <p:sp>
+        <p:nvSpPr>
+          <p:cNvPr id="4" name="Slide Image Placeholder 3"/>
+          <p:cNvSpPr>
+            <a:spLocks noGrp="1" noRot="1" noChangeAspect="1"/>
+          </p:cNvSpPr>
+          <p:nvPr>
+            <p:ph type="sldImg" idx="2"/>
+          </p:nvPr>
+        </p:nvSpPr>
+        <p:spPr>
+          <a:xfrm>
+            <a:off x="685800" y="1143000"/>
+            <a:ext cx="5486400" cy="3086100"/>
+          </a:xfrm>
+          <a:prstGeom prst="rect">
+            <a:avLst/>
+          </a:prstGeom>
+          <a:noFill/>
+          <a:ln w="12700">
+            <a:solidFill>
+              <a:prstClr val="black"/>
+            </a:solidFill>
+          </a:ln>
+        </p:spPr>
+        <p:txBody>
+          <a:bodyPr vert="horz" lIns="91440" tIns="45720" rIns="91440" bIns="45720" rtlCol="0" anchor="ctr"/>
+          <a:lstStyle/>
+          <a:p>
+            <a:endParaRPr lang="en-US"/>
+          </a:p>
+        </p:txBody>
+      </p:sp>
+      <p:sp>
+        <p:nvSpPr>
+          <p:cNvPr id="5" name="Notes Placeholder 4"/>
+          <p:cNvSpPr>
+            <a:spLocks noGrp="1"/>
+          </p:cNvSpPr>
+          <p:nvPr>
+            <p:ph type="body" sz="quarter" idx="3"/>
+          </p:nvPr>
+        </p:nvSpPr>
+        <p:spPr>
+          <a:xfrm>
+            <a:off x="685800" y="4400550"/>
+            <a:ext cx="5486400" cy="3600450"/>
+          </a:xfrm>
+          <a:prstGeom prst="rect">
+            <a:avLst/>
+          </a:prstGeom>
+        </p:spPr>
+        <p:txBody>
+          <a:bodyPr vert="horz" lIns="91440" tIns="45720" rIns="91440" bIns="45720" rtlCol="0"/>
+          <a:lstStyle/>
+          <a:p>
+            <a:pPr lvl="0"/>
+            <a:r>
+              <a:rPr lang="en-US"/>
+              <a:t>Edit Master text styles</a:t>
+            </a:r>
+          </a:p>
+          <a:p>
+            <a:pPr lvl="1"/>
+            <a:r>
+              <a:rPr lang="en-US"/>
+              <a:t>Second level</a:t>
+            </a:r>
+          </a:p>
+          <a:p>
+            <a:pPr lvl="2"/>
+            <a:r>
+              <a:rPr lang="en-US"/>
+              <a:t>Third level</a:t>
+            </a:r>
+          </a:p>
+          <a:p>
+            <a:pPr lvl="3"/>
+            <a:r>
+              <a:rPr lang="en-US"/>
+              <a:t>Fourth level</a:t>
+            </a:r>
+          </a:p>
+          <a:p>
+            <a:pPr lvl="4"/>
+            <a:r>
+              <a:rPr lang="en-US"/>
+              <a:t>Fifth level</a:t>
+            </a:r>
+          </a:p>
+        </p:txBody>
+      </p:sp>
+      <p:sp>
+        <p:nvSpPr>
+          <p:cNvPr id="6" name="Footer Placeholder 5"/>
+          <p:cNvSpPr>
+            <a:spLocks noGrp="1"/>
+          </p:cNvSpPr>
+          <p:nvPr>
+            <p:ph type="ftr" sz="quarter" idx="4"/>
+          </p:nvPr>
+        </p:nvSpPr>
+        <p:spPr>
+          <a:xfrm>
+            <a:off x="0" y="8685213"/>
+            <a:ext cx="2971800" cy="458787"/>
+          </a:xfrm>
+          <a:prstGeom prst="rect">
+            <a:avLst/>
+          </a:prstGeom>
+        </p:spPr>
+        <p:txBody>
+          <a:bodyPr vert="horz" lIns="91440" tIns="45720" rIns="91440" bIns="45720" rtlCol="0" anchor="b"/>
+          <a:lstStyle>
+            <a:lvl1pPr algn="l">
+              <a:defRPr sz="1200"/>
+            </a:lvl1pPr>
+          </a:lstStyle>
+          <a:p>
+            <a:endParaRPr lang="en-US"/>
+          </a:p>
+        </p:txBody>
+      </p:sp>
+      <p:sp>
+        <p:nvSpPr>
+          <p:cNvPr id="7" name="Slide Number Placeholder 6"/>
+          <p:cNvSpPr>
+            <a:spLocks noGrp="1"/>
+          </p:cNvSpPr>
+          <p:nvPr>
+            <p:ph type="sldNum" sz="quarter" idx="5"/>
+          </p:nvPr>
+        </p:nvSpPr>
+        <p:spPr>
+          <a:xfrm>
+            <a:off x="3884613" y="8685213"/>
+            <a:ext cx="2971800" cy="458787"/>
+          </a:xfrm>
+          <a:prstGeom prst="rect">
+            <a:avLst/>
+          </a:prstGeom>
+        </p:spPr>
+        <p:txBody>
+          <a:bodyPr vert="horz" lIns="91440" tIns="45720" rIns="91440" bIns="45720" rtlCol="0" anchor="b"/>
+          <a:lstStyle>
+            <a:lvl1pPr algn="r">
+              <a:defRPr sz="1200"/>
+            </a:lvl1pPr>
+          </a:lstStyle>
+          <a:p>
+            <a:fld id="{A5E3B634-187A-714A-9D7D-FC23E693A20E}" type="slidenum">
+              <a:rPr lang="en-US" smtClean="0"/>
+              <a:t>‹#›</a:t>
+            </a:fld>
+            <a:endParaRPr lang="en-US"/>
+          </a:p>
+        </p:txBody>
+      </p:sp>
+    </p:spTree>
+    <p:extLst>
+      <p:ext uri="{BB962C8B-B14F-4D97-AF65-F5344CB8AC3E}">
+        <p14:creationId xmlns:p14="http://schemas.microsoft.com/office/powerpoint/2010/main" val="4221703336"/>
+      </p:ext>
+    </p:extLst>
+  </p:cSld>
+  <p:clrMap bg1="lt1" tx1="dk1" bg2="lt2" tx2="dk2" accent1="accent1" accent2="accent2" accent3="accent3" accent4="accent4" accent5="accent5" accent6="accent6" hlink="hlink" folHlink="folHlink"/>
+  <p:notesStyle>
+    <a:lvl1pPr marL="0" algn="l" defTabSz="914400" rtl="0" eaLnBrk="1" latinLnBrk="0" hangingPunct="1">
+      <a:defRPr sz="1200" kern="1200">
+        <a:solidFill>
+          <a:schemeClr val="tx1"/>
+        </a:solidFill>
+        <a:latin typeface="+mn-lt"/>
+        <a:ea typeface="+mn-ea"/>
+        <a:cs typeface="+mn-cs"/>
+      </a:defRPr>
+    </a:lvl1pPr>
+    <a:lvl2pPr marL="457200" algn="l" defTabSz="914400" rtl="0" eaLnBrk="1" latinLnBrk="0" hangingPunct="1">
+      <a:defRPr sz="1200" kern="1200">
+        <a:solidFill>
+          <a:schemeClr val="tx1"/>
+        </a:solidFill>
+        <a:latin typeface="+mn-lt"/>
+        <a:ea typeface="+mn-ea"/>
+        <a:cs typeface="+mn-cs"/>
+      </a:defRPr>
+    </a:lvl2pPr>
+    <a:lvl3pPr marL="914400" algn="l" defTabSz="914400" rtl="0" eaLnBrk="1" latinLnBrk="0" hangingPunct="1">
+      <a:defRPr sz="1200" kern="1200">
+        <a:solidFill>
+          <a:schemeClr val="tx1"/>
+        </a:solidFill>
+        <a:latin typeface="+mn-lt"/>
+        <a:ea typeface="+mn-ea"/>
+        <a:cs typeface="+mn-cs"/>
+      </a:defRPr>
+    </a:lvl3pPr>
+    <a:lvl4pPr marL="1371600" algn="l" defTabSz="914400" rtl="0" eaLnBrk="1" latinLnBrk="0" hangingPunct="1">
+      <a:defRPr sz="1200" kern="1200">
+        <a:solidFill>
+          <a:schemeClr val="tx1"/>
+        </a:solidFill>
+        <a:latin typeface="+mn-lt"/>
+        <a:ea typeface="+mn-ea"/>
+        <a:cs typeface="+mn-cs"/>
+      </a:defRPr>
+    </a:lvl4pPr>
+    <a:lvl5pPr marL="1828800" algn="l" defTabSz="914400" rtl="0" eaLnBrk="1" latinLnBrk="0" hangingPunct="1">
+      <a:defRPr sz="1200" kern="1200">
+        <a:solidFill>
+          <a:schemeClr val="tx1"/>
+        </a:solidFill>
+        <a:latin typeface="+mn-lt"/>
+        <a:ea typeface="+mn-ea"/>
+        <a:cs typeface="+mn-cs"/>
+      </a:defRPr>
+    </a:lvl5pPr>
+    <a:lvl6pPr marL="2286000" algn="l" defTabSz="914400" rtl="0" eaLnBrk="1" latinLnBrk="0" hangingPunct="1">
+      <a:defRPr sz="1200" kern="1200">
+        <a:solidFill>
+          <a:schemeClr val="tx1"/>
+        </a:solidFill>
+        <a:latin typeface="+mn-lt"/>
+        <a:ea typeface="+mn-ea"/>
+        <a:cs typeface="+mn-cs"/>
+      </a:defRPr>
+    </a:lvl6pPr>
+    <a:lvl7pPr marL="2743200" algn="l" defTabSz="914400" rtl="0" eaLnBrk="1" latinLnBrk="0" hangingPunct="1">
+      <a:defRPr sz="1200" kern="1200">
+        <a:solidFill>
+          <a:schemeClr val="tx1"/>
+        </a:solidFill>
+        <a:latin typeface="+mn-lt"/>
+        <a:ea typeface="+mn-ea"/>
+        <a:cs typeface="+mn-cs"/>
+      </a:defRPr>
+    </a:lvl7pPr>
+    <a:lvl8pPr marL="3200400" algn="l" defTabSz="914400" rtl="0" eaLnBrk="1" latinLnBrk="0" hangingPunct="1">
+      <a:defRPr sz="1200" kern="1200">
+        <a:solidFill>
+          <a:schemeClr val="tx1"/>
+        </a:solidFill>
+        <a:latin typeface="+mn-lt"/>
+        <a:ea typeface="+mn-ea"/>
+        <a:cs typeface="+mn-cs"/>
+      </a:defRPr>
+    </a:lvl8pPr>
+    <a:lvl9pPr marL="3657600" algn="l" defTabSz="914400" rtl="0" eaLnBrk="1" latinLnBrk="0" hangingPunct="1">
+      <a:defRPr sz="1200" kern="1200">
+        <a:solidFill>
+          <a:schemeClr val="tx1"/>
+        </a:solidFill>
+        <a:latin typeface="+mn-lt"/>
+        <a:ea typeface="+mn-ea"/>
+        <a:cs typeface="+mn-cs"/>
+      </a:defRPr>
+    </a:lvl9pPr>
+  </p:notesStyle>
+</p:notesMaster>
+</file>
+
+<file path=ppt/notesSlides/notesSlide1.xml><?xml version="1.0" encoding="utf-8"?>
+<p:notes xmlns:a="http://schemas.openxmlformats.org/drawingml/2006/main" xmlns:r="http://schemas.openxmlformats.org/officeDocument/2006/relationships" xmlns:p="http://schemas.openxmlformats.org/presentationml/2006/main">
+  <p:cSld>
+    <p:spTree>
+      <p:nvGrpSpPr>
+        <p:cNvPr id="1" name=""/>
+        <p:cNvGrpSpPr/>
+        <p:nvPr/>
+      </p:nvGrpSpPr>
+      <p:grpSpPr>
+        <a:xfrm>
+          <a:off x="0" y="0"/>
+          <a:ext cx="0" cy="0"/>
+          <a:chOff x="0" y="0"/>
+          <a:chExt cx="0" cy="0"/>
+        </a:xfrm>
+      </p:grpSpPr>
+      <p:sp>
+        <p:nvSpPr>
+          <p:cNvPr id="2" name="Slide Image Placeholder 1"/>
+          <p:cNvSpPr>
+            <a:spLocks noGrp="1" noRot="1" noChangeAspect="1"/>
+          </p:cNvSpPr>
+          <p:nvPr>
+            <p:ph type="sldImg"/>
+          </p:nvPr>
+        </p:nvSpPr>
+        <p:spPr/>
+      </p:sp>
+      <p:sp>
+        <p:nvSpPr>
+          <p:cNvPr id="3" name="Notes Placeholder 2"/>
+          <p:cNvSpPr>
+            <a:spLocks noGrp="1"/>
+          </p:cNvSpPr>
+          <p:nvPr>
+            <p:ph type="body" idx="1"/>
+          </p:nvPr>
+        </p:nvSpPr>
+        <p:spPr/>
+        <p:txBody>
+          <a:bodyPr/>
+          <a:lstStyle/>
+          <a:p>
+            <a:r>
+              <a:rPr lang="en-US" dirty="0"/>
+              <a:t>In this Chapter we introduce the key concepts behind agent-based modelling.  What is an agent, and what are rules?  These are discussed along with a consideration of the main advantages and disadvantages for simulating spatial systems.  A range of established applications are presented to give a </a:t>
+            </a:r>
+            <a:r>
+              <a:rPr lang="en-US" dirty="0" err="1"/>
+              <a:t>flavour</a:t>
+            </a:r>
+            <a:r>
+              <a:rPr lang="en-US" dirty="0"/>
+              <a:t> of how agent-based models can be successfully applied.  The overarching aim of this chapter is to give the reader an understanding of what an agent-based model is.  This knowledge will be built upon in subsequent chapters. </a:t>
+            </a:r>
+          </a:p>
+          <a:p>
+            <a:endParaRPr lang="en-US" dirty="0"/>
+          </a:p>
+        </p:txBody>
+      </p:sp>
+      <p:sp>
+        <p:nvSpPr>
+          <p:cNvPr id="4" name="Slide Number Placeholder 3"/>
+          <p:cNvSpPr>
+            <a:spLocks noGrp="1"/>
+          </p:cNvSpPr>
+          <p:nvPr>
+            <p:ph type="sldNum" sz="quarter" idx="10"/>
+          </p:nvPr>
+        </p:nvSpPr>
+        <p:spPr/>
+        <p:txBody>
+          <a:bodyPr/>
+          <a:lstStyle/>
+          <a:p>
+            <a:fld id="{A5E3B634-187A-714A-9D7D-FC23E693A20E}" type="slidenum">
+              <a:rPr lang="en-US" smtClean="0"/>
+              <a:t>1</a:t>
+            </a:fld>
+            <a:endParaRPr lang="en-US"/>
+          </a:p>
+        </p:txBody>
+      </p:sp>
+    </p:spTree>
+    <p:extLst>
+      <p:ext uri="{BB962C8B-B14F-4D97-AF65-F5344CB8AC3E}">
+        <p14:creationId xmlns:p14="http://schemas.microsoft.com/office/powerpoint/2010/main" val="3001100337"/>
+      </p:ext>
+    </p:extLst>
+  </p:cSld>
+  <p:clrMapOvr>
+    <a:masterClrMapping/>
+  </p:clrMapOvr>
+</p:notes>
+</file>
+
 <file path=ppt/slideLayouts/slideLayout1.xml><?xml version="1.0" encoding="utf-8"?>
 <p:sldLayout xmlns:a="http://schemas.openxmlformats.org/drawingml/2006/main" xmlns:r="http://schemas.openxmlformats.org/officeDocument/2006/relationships" xmlns:p="http://schemas.openxmlformats.org/presentationml/2006/main" type="title" preserve="1">
   <p:cSld name="Title Slide">
@@ -134,7 +585,7 @@
           <p:cNvPr id="2" name="Title 1">
             <a:extLst>
               <a:ext uri="{FF2B5EF4-FFF2-40B4-BE49-F238E27FC236}">
-                <a16:creationId xmlns:a16="http://schemas.microsoft.com/office/drawing/2014/main" id="{516F7A16-E78A-BE4A-AC43-8512E7D93291}"/>
+                <a16:creationId xmlns:a16="http://schemas.microsoft.com/office/drawing/2014/main" xmlns="" id="{516F7A16-E78A-BE4A-AC43-8512E7D93291}"/>
               </a:ext>
             </a:extLst>
           </p:cNvPr>
@@ -171,7 +622,7 @@
           <p:cNvPr id="3" name="Subtitle 2">
             <a:extLst>
               <a:ext uri="{FF2B5EF4-FFF2-40B4-BE49-F238E27FC236}">
-                <a16:creationId xmlns:a16="http://schemas.microsoft.com/office/drawing/2014/main" id="{7C1F38C8-365B-CA4F-B19D-567E737B1A06}"/>
+                <a16:creationId xmlns:a16="http://schemas.microsoft.com/office/drawing/2014/main" xmlns="" id="{7C1F38C8-365B-CA4F-B19D-567E737B1A06}"/>
               </a:ext>
             </a:extLst>
           </p:cNvPr>
@@ -241,7 +692,7 @@
           <p:cNvPr id="4" name="Date Placeholder 3">
             <a:extLst>
               <a:ext uri="{FF2B5EF4-FFF2-40B4-BE49-F238E27FC236}">
-                <a16:creationId xmlns:a16="http://schemas.microsoft.com/office/drawing/2014/main" id="{16A28210-3A32-5F42-B6C1-4EC7285777A7}"/>
+                <a16:creationId xmlns:a16="http://schemas.microsoft.com/office/drawing/2014/main" xmlns="" id="{16A28210-3A32-5F42-B6C1-4EC7285777A7}"/>
               </a:ext>
             </a:extLst>
           </p:cNvPr>
@@ -259,7 +710,7 @@
           <a:p>
             <a:fld id="{53326AB7-C146-8643-AC32-1D896C71A7F3}" type="datetimeFigureOut">
               <a:rPr lang="en-US" smtClean="0"/>
-              <a:t>7/21/18</a:t>
+              <a:t>7/23/18</a:t>
             </a:fld>
             <a:endParaRPr lang="en-US"/>
           </a:p>
@@ -270,7 +721,7 @@
           <p:cNvPr id="5" name="Footer Placeholder 4">
             <a:extLst>
               <a:ext uri="{FF2B5EF4-FFF2-40B4-BE49-F238E27FC236}">
-                <a16:creationId xmlns:a16="http://schemas.microsoft.com/office/drawing/2014/main" id="{906277F9-D1A2-9843-B607-FCC14A031A43}"/>
+                <a16:creationId xmlns:a16="http://schemas.microsoft.com/office/drawing/2014/main" xmlns="" id="{906277F9-D1A2-9843-B607-FCC14A031A43}"/>
               </a:ext>
             </a:extLst>
           </p:cNvPr>
@@ -295,7 +746,7 @@
           <p:cNvPr id="6" name="Slide Number Placeholder 5">
             <a:extLst>
               <a:ext uri="{FF2B5EF4-FFF2-40B4-BE49-F238E27FC236}">
-                <a16:creationId xmlns:a16="http://schemas.microsoft.com/office/drawing/2014/main" id="{C7280A87-2C80-A64B-87FB-EF30B3D84BEC}"/>
+                <a16:creationId xmlns:a16="http://schemas.microsoft.com/office/drawing/2014/main" xmlns="" id="{C7280A87-2C80-A64B-87FB-EF30B3D84BEC}"/>
               </a:ext>
             </a:extLst>
           </p:cNvPr>
@@ -354,7 +805,7 @@
           <p:cNvPr id="2" name="Title 1">
             <a:extLst>
               <a:ext uri="{FF2B5EF4-FFF2-40B4-BE49-F238E27FC236}">
-                <a16:creationId xmlns:a16="http://schemas.microsoft.com/office/drawing/2014/main" id="{B36B44AF-4076-ED4B-B391-C5A3489C0456}"/>
+                <a16:creationId xmlns:a16="http://schemas.microsoft.com/office/drawing/2014/main" xmlns="" id="{B36B44AF-4076-ED4B-B391-C5A3489C0456}"/>
               </a:ext>
             </a:extLst>
           </p:cNvPr>
@@ -382,7 +833,7 @@
           <p:cNvPr id="3" name="Vertical Text Placeholder 2">
             <a:extLst>
               <a:ext uri="{FF2B5EF4-FFF2-40B4-BE49-F238E27FC236}">
-                <a16:creationId xmlns:a16="http://schemas.microsoft.com/office/drawing/2014/main" id="{87C2274F-54BF-764B-B515-33F41ADD7AE2}"/>
+                <a16:creationId xmlns:a16="http://schemas.microsoft.com/office/drawing/2014/main" xmlns="" id="{87C2274F-54BF-764B-B515-33F41ADD7AE2}"/>
               </a:ext>
             </a:extLst>
           </p:cNvPr>
@@ -439,7 +890,7 @@
           <p:cNvPr id="4" name="Date Placeholder 3">
             <a:extLst>
               <a:ext uri="{FF2B5EF4-FFF2-40B4-BE49-F238E27FC236}">
-                <a16:creationId xmlns:a16="http://schemas.microsoft.com/office/drawing/2014/main" id="{6423412C-0D19-274E-9402-8A7B85561B08}"/>
+                <a16:creationId xmlns:a16="http://schemas.microsoft.com/office/drawing/2014/main" xmlns="" id="{6423412C-0D19-274E-9402-8A7B85561B08}"/>
               </a:ext>
             </a:extLst>
           </p:cNvPr>
@@ -457,7 +908,7 @@
           <a:p>
             <a:fld id="{53326AB7-C146-8643-AC32-1D896C71A7F3}" type="datetimeFigureOut">
               <a:rPr lang="en-US" smtClean="0"/>
-              <a:t>7/21/18</a:t>
+              <a:t>7/23/18</a:t>
             </a:fld>
             <a:endParaRPr lang="en-US"/>
           </a:p>
@@ -468,7 +919,7 @@
           <p:cNvPr id="5" name="Footer Placeholder 4">
             <a:extLst>
               <a:ext uri="{FF2B5EF4-FFF2-40B4-BE49-F238E27FC236}">
-                <a16:creationId xmlns:a16="http://schemas.microsoft.com/office/drawing/2014/main" id="{AC034415-ED19-A445-BD68-A64A25C07F45}"/>
+                <a16:creationId xmlns:a16="http://schemas.microsoft.com/office/drawing/2014/main" xmlns="" id="{AC034415-ED19-A445-BD68-A64A25C07F45}"/>
               </a:ext>
             </a:extLst>
           </p:cNvPr>
@@ -493,7 +944,7 @@
           <p:cNvPr id="6" name="Slide Number Placeholder 5">
             <a:extLst>
               <a:ext uri="{FF2B5EF4-FFF2-40B4-BE49-F238E27FC236}">
-                <a16:creationId xmlns:a16="http://schemas.microsoft.com/office/drawing/2014/main" id="{08E3F4D4-B881-F34A-81D6-2E0313F65EEA}"/>
+                <a16:creationId xmlns:a16="http://schemas.microsoft.com/office/drawing/2014/main" xmlns="" id="{08E3F4D4-B881-F34A-81D6-2E0313F65EEA}"/>
               </a:ext>
             </a:extLst>
           </p:cNvPr>
@@ -552,7 +1003,7 @@
           <p:cNvPr id="2" name="Vertical Title 1">
             <a:extLst>
               <a:ext uri="{FF2B5EF4-FFF2-40B4-BE49-F238E27FC236}">
-                <a16:creationId xmlns:a16="http://schemas.microsoft.com/office/drawing/2014/main" id="{BDD434B5-95B9-8F45-9704-269CFCDE3CF0}"/>
+                <a16:creationId xmlns:a16="http://schemas.microsoft.com/office/drawing/2014/main" xmlns="" id="{BDD434B5-95B9-8F45-9704-269CFCDE3CF0}"/>
               </a:ext>
             </a:extLst>
           </p:cNvPr>
@@ -585,7 +1036,7 @@
           <p:cNvPr id="3" name="Vertical Text Placeholder 2">
             <a:extLst>
               <a:ext uri="{FF2B5EF4-FFF2-40B4-BE49-F238E27FC236}">
-                <a16:creationId xmlns:a16="http://schemas.microsoft.com/office/drawing/2014/main" id="{C0E99913-B6B0-7C48-9E46-20EC11E0D7B8}"/>
+                <a16:creationId xmlns:a16="http://schemas.microsoft.com/office/drawing/2014/main" xmlns="" id="{C0E99913-B6B0-7C48-9E46-20EC11E0D7B8}"/>
               </a:ext>
             </a:extLst>
           </p:cNvPr>
@@ -647,7 +1098,7 @@
           <p:cNvPr id="4" name="Date Placeholder 3">
             <a:extLst>
               <a:ext uri="{FF2B5EF4-FFF2-40B4-BE49-F238E27FC236}">
-                <a16:creationId xmlns:a16="http://schemas.microsoft.com/office/drawing/2014/main" id="{B5CE55D2-ADC8-E348-B484-18FD79F5F120}"/>
+                <a16:creationId xmlns:a16="http://schemas.microsoft.com/office/drawing/2014/main" xmlns="" id="{B5CE55D2-ADC8-E348-B484-18FD79F5F120}"/>
               </a:ext>
             </a:extLst>
           </p:cNvPr>
@@ -665,7 +1116,7 @@
           <a:p>
             <a:fld id="{53326AB7-C146-8643-AC32-1D896C71A7F3}" type="datetimeFigureOut">
               <a:rPr lang="en-US" smtClean="0"/>
-              <a:t>7/21/18</a:t>
+              <a:t>7/23/18</a:t>
             </a:fld>
             <a:endParaRPr lang="en-US"/>
           </a:p>
@@ -676,7 +1127,7 @@
           <p:cNvPr id="5" name="Footer Placeholder 4">
             <a:extLst>
               <a:ext uri="{FF2B5EF4-FFF2-40B4-BE49-F238E27FC236}">
-                <a16:creationId xmlns:a16="http://schemas.microsoft.com/office/drawing/2014/main" id="{9547F7AC-E50A-D649-85D6-DB77ADB23342}"/>
+                <a16:creationId xmlns:a16="http://schemas.microsoft.com/office/drawing/2014/main" xmlns="" id="{9547F7AC-E50A-D649-85D6-DB77ADB23342}"/>
               </a:ext>
             </a:extLst>
           </p:cNvPr>
@@ -701,7 +1152,7 @@
           <p:cNvPr id="6" name="Slide Number Placeholder 5">
             <a:extLst>
               <a:ext uri="{FF2B5EF4-FFF2-40B4-BE49-F238E27FC236}">
-                <a16:creationId xmlns:a16="http://schemas.microsoft.com/office/drawing/2014/main" id="{4BB89C60-9BE1-C544-82FC-951DBED57A52}"/>
+                <a16:creationId xmlns:a16="http://schemas.microsoft.com/office/drawing/2014/main" xmlns="" id="{4BB89C60-9BE1-C544-82FC-951DBED57A52}"/>
               </a:ext>
             </a:extLst>
           </p:cNvPr>
@@ -760,7 +1211,7 @@
           <p:cNvPr id="2" name="Title 1">
             <a:extLst>
               <a:ext uri="{FF2B5EF4-FFF2-40B4-BE49-F238E27FC236}">
-                <a16:creationId xmlns:a16="http://schemas.microsoft.com/office/drawing/2014/main" id="{0C9A72FB-6E84-2F49-8A51-0972418C72A2}"/>
+                <a16:creationId xmlns:a16="http://schemas.microsoft.com/office/drawing/2014/main" xmlns="" id="{0C9A72FB-6E84-2F49-8A51-0972418C72A2}"/>
               </a:ext>
             </a:extLst>
           </p:cNvPr>
@@ -788,7 +1239,7 @@
           <p:cNvPr id="3" name="Content Placeholder 2">
             <a:extLst>
               <a:ext uri="{FF2B5EF4-FFF2-40B4-BE49-F238E27FC236}">
-                <a16:creationId xmlns:a16="http://schemas.microsoft.com/office/drawing/2014/main" id="{5F9F1C8D-6F5A-7D47-9201-3E7B6F545192}"/>
+                <a16:creationId xmlns:a16="http://schemas.microsoft.com/office/drawing/2014/main" xmlns="" id="{5F9F1C8D-6F5A-7D47-9201-3E7B6F545192}"/>
               </a:ext>
             </a:extLst>
           </p:cNvPr>
@@ -845,7 +1296,7 @@
           <p:cNvPr id="4" name="Date Placeholder 3">
             <a:extLst>
               <a:ext uri="{FF2B5EF4-FFF2-40B4-BE49-F238E27FC236}">
-                <a16:creationId xmlns:a16="http://schemas.microsoft.com/office/drawing/2014/main" id="{CA4AB3CC-E7E0-6340-B3A4-F00DB09C83B6}"/>
+                <a16:creationId xmlns:a16="http://schemas.microsoft.com/office/drawing/2014/main" xmlns="" id="{CA4AB3CC-E7E0-6340-B3A4-F00DB09C83B6}"/>
               </a:ext>
             </a:extLst>
           </p:cNvPr>
@@ -863,7 +1314,7 @@
           <a:p>
             <a:fld id="{53326AB7-C146-8643-AC32-1D896C71A7F3}" type="datetimeFigureOut">
               <a:rPr lang="en-US" smtClean="0"/>
-              <a:t>7/21/18</a:t>
+              <a:t>7/23/18</a:t>
             </a:fld>
             <a:endParaRPr lang="en-US"/>
           </a:p>
@@ -874,7 +1325,7 @@
           <p:cNvPr id="5" name="Footer Placeholder 4">
             <a:extLst>
               <a:ext uri="{FF2B5EF4-FFF2-40B4-BE49-F238E27FC236}">
-                <a16:creationId xmlns:a16="http://schemas.microsoft.com/office/drawing/2014/main" id="{7D837D03-AC59-D14F-9507-84D846908444}"/>
+                <a16:creationId xmlns:a16="http://schemas.microsoft.com/office/drawing/2014/main" xmlns="" id="{7D837D03-AC59-D14F-9507-84D846908444}"/>
               </a:ext>
             </a:extLst>
           </p:cNvPr>
@@ -899,7 +1350,7 @@
           <p:cNvPr id="6" name="Slide Number Placeholder 5">
             <a:extLst>
               <a:ext uri="{FF2B5EF4-FFF2-40B4-BE49-F238E27FC236}">
-                <a16:creationId xmlns:a16="http://schemas.microsoft.com/office/drawing/2014/main" id="{BA139326-81CE-0942-A45E-A9A8005451CA}"/>
+                <a16:creationId xmlns:a16="http://schemas.microsoft.com/office/drawing/2014/main" xmlns="" id="{BA139326-81CE-0942-A45E-A9A8005451CA}"/>
               </a:ext>
             </a:extLst>
           </p:cNvPr>
@@ -958,7 +1409,7 @@
           <p:cNvPr id="2" name="Title 1">
             <a:extLst>
               <a:ext uri="{FF2B5EF4-FFF2-40B4-BE49-F238E27FC236}">
-                <a16:creationId xmlns:a16="http://schemas.microsoft.com/office/drawing/2014/main" id="{1D188158-F8C2-434F-AD68-D86B3031D91D}"/>
+                <a16:creationId xmlns:a16="http://schemas.microsoft.com/office/drawing/2014/main" xmlns="" id="{1D188158-F8C2-434F-AD68-D86B3031D91D}"/>
               </a:ext>
             </a:extLst>
           </p:cNvPr>
@@ -995,7 +1446,7 @@
           <p:cNvPr id="3" name="Text Placeholder 2">
             <a:extLst>
               <a:ext uri="{FF2B5EF4-FFF2-40B4-BE49-F238E27FC236}">
-                <a16:creationId xmlns:a16="http://schemas.microsoft.com/office/drawing/2014/main" id="{6BCBB0E7-5DE5-0D42-9359-2B7E8DAA3C79}"/>
+                <a16:creationId xmlns:a16="http://schemas.microsoft.com/office/drawing/2014/main" xmlns="" id="{6BCBB0E7-5DE5-0D42-9359-2B7E8DAA3C79}"/>
               </a:ext>
             </a:extLst>
           </p:cNvPr>
@@ -1120,7 +1571,7 @@
           <p:cNvPr id="4" name="Date Placeholder 3">
             <a:extLst>
               <a:ext uri="{FF2B5EF4-FFF2-40B4-BE49-F238E27FC236}">
-                <a16:creationId xmlns:a16="http://schemas.microsoft.com/office/drawing/2014/main" id="{B610A837-B060-AA46-AA08-6F233B11970D}"/>
+                <a16:creationId xmlns:a16="http://schemas.microsoft.com/office/drawing/2014/main" xmlns="" id="{B610A837-B060-AA46-AA08-6F233B11970D}"/>
               </a:ext>
             </a:extLst>
           </p:cNvPr>
@@ -1138,7 +1589,7 @@
           <a:p>
             <a:fld id="{53326AB7-C146-8643-AC32-1D896C71A7F3}" type="datetimeFigureOut">
               <a:rPr lang="en-US" smtClean="0"/>
-              <a:t>7/21/18</a:t>
+              <a:t>7/23/18</a:t>
             </a:fld>
             <a:endParaRPr lang="en-US"/>
           </a:p>
@@ -1149,7 +1600,7 @@
           <p:cNvPr id="5" name="Footer Placeholder 4">
             <a:extLst>
               <a:ext uri="{FF2B5EF4-FFF2-40B4-BE49-F238E27FC236}">
-                <a16:creationId xmlns:a16="http://schemas.microsoft.com/office/drawing/2014/main" id="{5CFEE10B-C123-1B45-B864-6B8D5BE99A92}"/>
+                <a16:creationId xmlns:a16="http://schemas.microsoft.com/office/drawing/2014/main" xmlns="" id="{5CFEE10B-C123-1B45-B864-6B8D5BE99A92}"/>
               </a:ext>
             </a:extLst>
           </p:cNvPr>
@@ -1174,7 +1625,7 @@
           <p:cNvPr id="6" name="Slide Number Placeholder 5">
             <a:extLst>
               <a:ext uri="{FF2B5EF4-FFF2-40B4-BE49-F238E27FC236}">
-                <a16:creationId xmlns:a16="http://schemas.microsoft.com/office/drawing/2014/main" id="{A0CCC4B6-2F8B-CA45-99D7-D48C1C9972FA}"/>
+                <a16:creationId xmlns:a16="http://schemas.microsoft.com/office/drawing/2014/main" xmlns="" id="{A0CCC4B6-2F8B-CA45-99D7-D48C1C9972FA}"/>
               </a:ext>
             </a:extLst>
           </p:cNvPr>
@@ -1233,7 +1684,7 @@
           <p:cNvPr id="2" name="Title 1">
             <a:extLst>
               <a:ext uri="{FF2B5EF4-FFF2-40B4-BE49-F238E27FC236}">
-                <a16:creationId xmlns:a16="http://schemas.microsoft.com/office/drawing/2014/main" id="{E7B8530F-2ABB-F741-86CD-02B983C499B4}"/>
+                <a16:creationId xmlns:a16="http://schemas.microsoft.com/office/drawing/2014/main" xmlns="" id="{E7B8530F-2ABB-F741-86CD-02B983C499B4}"/>
               </a:ext>
             </a:extLst>
           </p:cNvPr>
@@ -1261,7 +1712,7 @@
           <p:cNvPr id="3" name="Content Placeholder 2">
             <a:extLst>
               <a:ext uri="{FF2B5EF4-FFF2-40B4-BE49-F238E27FC236}">
-                <a16:creationId xmlns:a16="http://schemas.microsoft.com/office/drawing/2014/main" id="{787B270D-31DF-824D-AAC7-1A8C490EB907}"/>
+                <a16:creationId xmlns:a16="http://schemas.microsoft.com/office/drawing/2014/main" xmlns="" id="{787B270D-31DF-824D-AAC7-1A8C490EB907}"/>
               </a:ext>
             </a:extLst>
           </p:cNvPr>
@@ -1323,7 +1774,7 @@
           <p:cNvPr id="4" name="Content Placeholder 3">
             <a:extLst>
               <a:ext uri="{FF2B5EF4-FFF2-40B4-BE49-F238E27FC236}">
-                <a16:creationId xmlns:a16="http://schemas.microsoft.com/office/drawing/2014/main" id="{E0A55378-871B-074A-9340-5A273CC14711}"/>
+                <a16:creationId xmlns:a16="http://schemas.microsoft.com/office/drawing/2014/main" xmlns="" id="{E0A55378-871B-074A-9340-5A273CC14711}"/>
               </a:ext>
             </a:extLst>
           </p:cNvPr>
@@ -1385,7 +1836,7 @@
           <p:cNvPr id="5" name="Date Placeholder 4">
             <a:extLst>
               <a:ext uri="{FF2B5EF4-FFF2-40B4-BE49-F238E27FC236}">
-                <a16:creationId xmlns:a16="http://schemas.microsoft.com/office/drawing/2014/main" id="{7D61FB1B-E7C3-3547-A1B6-22B90A24B538}"/>
+                <a16:creationId xmlns:a16="http://schemas.microsoft.com/office/drawing/2014/main" xmlns="" id="{7D61FB1B-E7C3-3547-A1B6-22B90A24B538}"/>
               </a:ext>
             </a:extLst>
           </p:cNvPr>
@@ -1403,7 +1854,7 @@
           <a:p>
             <a:fld id="{53326AB7-C146-8643-AC32-1D896C71A7F3}" type="datetimeFigureOut">
               <a:rPr lang="en-US" smtClean="0"/>
-              <a:t>7/21/18</a:t>
+              <a:t>7/23/18</a:t>
             </a:fld>
             <a:endParaRPr lang="en-US"/>
           </a:p>
@@ -1414,7 +1865,7 @@
           <p:cNvPr id="6" name="Footer Placeholder 5">
             <a:extLst>
               <a:ext uri="{FF2B5EF4-FFF2-40B4-BE49-F238E27FC236}">
-                <a16:creationId xmlns:a16="http://schemas.microsoft.com/office/drawing/2014/main" id="{7F3ECCE9-7B6F-4948-8417-3E618E857711}"/>
+                <a16:creationId xmlns:a16="http://schemas.microsoft.com/office/drawing/2014/main" xmlns="" id="{7F3ECCE9-7B6F-4948-8417-3E618E857711}"/>
               </a:ext>
             </a:extLst>
           </p:cNvPr>
@@ -1439,7 +1890,7 @@
           <p:cNvPr id="7" name="Slide Number Placeholder 6">
             <a:extLst>
               <a:ext uri="{FF2B5EF4-FFF2-40B4-BE49-F238E27FC236}">
-                <a16:creationId xmlns:a16="http://schemas.microsoft.com/office/drawing/2014/main" id="{3E8C9493-26BA-D644-84CB-6514BD1933CA}"/>
+                <a16:creationId xmlns:a16="http://schemas.microsoft.com/office/drawing/2014/main" xmlns="" id="{3E8C9493-26BA-D644-84CB-6514BD1933CA}"/>
               </a:ext>
             </a:extLst>
           </p:cNvPr>
@@ -1498,7 +1949,7 @@
           <p:cNvPr id="2" name="Title 1">
             <a:extLst>
               <a:ext uri="{FF2B5EF4-FFF2-40B4-BE49-F238E27FC236}">
-                <a16:creationId xmlns:a16="http://schemas.microsoft.com/office/drawing/2014/main" id="{721BFA1D-0768-FC4F-B75B-EDE0297EB4EE}"/>
+                <a16:creationId xmlns:a16="http://schemas.microsoft.com/office/drawing/2014/main" xmlns="" id="{721BFA1D-0768-FC4F-B75B-EDE0297EB4EE}"/>
               </a:ext>
             </a:extLst>
           </p:cNvPr>
@@ -1531,7 +1982,7 @@
           <p:cNvPr id="3" name="Text Placeholder 2">
             <a:extLst>
               <a:ext uri="{FF2B5EF4-FFF2-40B4-BE49-F238E27FC236}">
-                <a16:creationId xmlns:a16="http://schemas.microsoft.com/office/drawing/2014/main" id="{9C5D8327-4932-5241-83AC-C7F223825714}"/>
+                <a16:creationId xmlns:a16="http://schemas.microsoft.com/office/drawing/2014/main" xmlns="" id="{9C5D8327-4932-5241-83AC-C7F223825714}"/>
               </a:ext>
             </a:extLst>
           </p:cNvPr>
@@ -1602,7 +2053,7 @@
           <p:cNvPr id="4" name="Content Placeholder 3">
             <a:extLst>
               <a:ext uri="{FF2B5EF4-FFF2-40B4-BE49-F238E27FC236}">
-                <a16:creationId xmlns:a16="http://schemas.microsoft.com/office/drawing/2014/main" id="{A9529289-DA97-FA4F-883B-1C08A606C7C7}"/>
+                <a16:creationId xmlns:a16="http://schemas.microsoft.com/office/drawing/2014/main" xmlns="" id="{A9529289-DA97-FA4F-883B-1C08A606C7C7}"/>
               </a:ext>
             </a:extLst>
           </p:cNvPr>
@@ -1664,7 +2115,7 @@
           <p:cNvPr id="5" name="Text Placeholder 4">
             <a:extLst>
               <a:ext uri="{FF2B5EF4-FFF2-40B4-BE49-F238E27FC236}">
-                <a16:creationId xmlns:a16="http://schemas.microsoft.com/office/drawing/2014/main" id="{55D275AA-C108-7C4D-9250-CEC009533B9E}"/>
+                <a16:creationId xmlns:a16="http://schemas.microsoft.com/office/drawing/2014/main" xmlns="" id="{55D275AA-C108-7C4D-9250-CEC009533B9E}"/>
               </a:ext>
             </a:extLst>
           </p:cNvPr>
@@ -1735,7 +2186,7 @@
           <p:cNvPr id="6" name="Content Placeholder 5">
             <a:extLst>
               <a:ext uri="{FF2B5EF4-FFF2-40B4-BE49-F238E27FC236}">
-                <a16:creationId xmlns:a16="http://schemas.microsoft.com/office/drawing/2014/main" id="{04C4C786-F911-8F45-B48E-D4C85A8F3C22}"/>
+                <a16:creationId xmlns:a16="http://schemas.microsoft.com/office/drawing/2014/main" xmlns="" id="{04C4C786-F911-8F45-B48E-D4C85A8F3C22}"/>
               </a:ext>
             </a:extLst>
           </p:cNvPr>
@@ -1797,7 +2248,7 @@
           <p:cNvPr id="7" name="Date Placeholder 6">
             <a:extLst>
               <a:ext uri="{FF2B5EF4-FFF2-40B4-BE49-F238E27FC236}">
-                <a16:creationId xmlns:a16="http://schemas.microsoft.com/office/drawing/2014/main" id="{2F578C52-1C7D-8B4B-BA4A-CE1D6F06640F}"/>
+                <a16:creationId xmlns:a16="http://schemas.microsoft.com/office/drawing/2014/main" xmlns="" id="{2F578C52-1C7D-8B4B-BA4A-CE1D6F06640F}"/>
               </a:ext>
             </a:extLst>
           </p:cNvPr>
@@ -1815,7 +2266,7 @@
           <a:p>
             <a:fld id="{53326AB7-C146-8643-AC32-1D896C71A7F3}" type="datetimeFigureOut">
               <a:rPr lang="en-US" smtClean="0"/>
-              <a:t>7/21/18</a:t>
+              <a:t>7/23/18</a:t>
             </a:fld>
             <a:endParaRPr lang="en-US"/>
           </a:p>
@@ -1826,7 +2277,7 @@
           <p:cNvPr id="8" name="Footer Placeholder 7">
             <a:extLst>
               <a:ext uri="{FF2B5EF4-FFF2-40B4-BE49-F238E27FC236}">
-                <a16:creationId xmlns:a16="http://schemas.microsoft.com/office/drawing/2014/main" id="{7E6D7468-D98E-E146-8C11-566E681496AE}"/>
+                <a16:creationId xmlns:a16="http://schemas.microsoft.com/office/drawing/2014/main" xmlns="" id="{7E6D7468-D98E-E146-8C11-566E681496AE}"/>
               </a:ext>
             </a:extLst>
           </p:cNvPr>
@@ -1851,7 +2302,7 @@
           <p:cNvPr id="9" name="Slide Number Placeholder 8">
             <a:extLst>
               <a:ext uri="{FF2B5EF4-FFF2-40B4-BE49-F238E27FC236}">
-                <a16:creationId xmlns:a16="http://schemas.microsoft.com/office/drawing/2014/main" id="{063284EF-707E-DC42-ACCE-D4654F57CD2A}"/>
+                <a16:creationId xmlns:a16="http://schemas.microsoft.com/office/drawing/2014/main" xmlns="" id="{063284EF-707E-DC42-ACCE-D4654F57CD2A}"/>
               </a:ext>
             </a:extLst>
           </p:cNvPr>
@@ -1910,7 +2361,7 @@
           <p:cNvPr id="2" name="Title 1">
             <a:extLst>
               <a:ext uri="{FF2B5EF4-FFF2-40B4-BE49-F238E27FC236}">
-                <a16:creationId xmlns:a16="http://schemas.microsoft.com/office/drawing/2014/main" id="{28A70226-982E-E240-BF1F-97AC71D0A35B}"/>
+                <a16:creationId xmlns:a16="http://schemas.microsoft.com/office/drawing/2014/main" xmlns="" id="{28A70226-982E-E240-BF1F-97AC71D0A35B}"/>
               </a:ext>
             </a:extLst>
           </p:cNvPr>
@@ -1938,7 +2389,7 @@
           <p:cNvPr id="3" name="Date Placeholder 2">
             <a:extLst>
               <a:ext uri="{FF2B5EF4-FFF2-40B4-BE49-F238E27FC236}">
-                <a16:creationId xmlns:a16="http://schemas.microsoft.com/office/drawing/2014/main" id="{63C30596-EF95-C943-9C4C-04001C8BADF1}"/>
+                <a16:creationId xmlns:a16="http://schemas.microsoft.com/office/drawing/2014/main" xmlns="" id="{63C30596-EF95-C943-9C4C-04001C8BADF1}"/>
               </a:ext>
             </a:extLst>
           </p:cNvPr>
@@ -1956,7 +2407,7 @@
           <a:p>
             <a:fld id="{53326AB7-C146-8643-AC32-1D896C71A7F3}" type="datetimeFigureOut">
               <a:rPr lang="en-US" smtClean="0"/>
-              <a:t>7/21/18</a:t>
+              <a:t>7/23/18</a:t>
             </a:fld>
             <a:endParaRPr lang="en-US"/>
           </a:p>
@@ -1967,7 +2418,7 @@
           <p:cNvPr id="4" name="Footer Placeholder 3">
             <a:extLst>
               <a:ext uri="{FF2B5EF4-FFF2-40B4-BE49-F238E27FC236}">
-                <a16:creationId xmlns:a16="http://schemas.microsoft.com/office/drawing/2014/main" id="{332BA8BC-065B-2742-86D8-3DAEEF7DC56E}"/>
+                <a16:creationId xmlns:a16="http://schemas.microsoft.com/office/drawing/2014/main" xmlns="" id="{332BA8BC-065B-2742-86D8-3DAEEF7DC56E}"/>
               </a:ext>
             </a:extLst>
           </p:cNvPr>
@@ -1992,7 +2443,7 @@
           <p:cNvPr id="5" name="Slide Number Placeholder 4">
             <a:extLst>
               <a:ext uri="{FF2B5EF4-FFF2-40B4-BE49-F238E27FC236}">
-                <a16:creationId xmlns:a16="http://schemas.microsoft.com/office/drawing/2014/main" id="{5DCD01E8-BA1E-A747-8D70-0629550712AB}"/>
+                <a16:creationId xmlns:a16="http://schemas.microsoft.com/office/drawing/2014/main" xmlns="" id="{5DCD01E8-BA1E-A747-8D70-0629550712AB}"/>
               </a:ext>
             </a:extLst>
           </p:cNvPr>
@@ -2051,7 +2502,7 @@
           <p:cNvPr id="2" name="Date Placeholder 1">
             <a:extLst>
               <a:ext uri="{FF2B5EF4-FFF2-40B4-BE49-F238E27FC236}">
-                <a16:creationId xmlns:a16="http://schemas.microsoft.com/office/drawing/2014/main" id="{8CC8AFC9-2394-FA4D-997A-E88CEA272745}"/>
+                <a16:creationId xmlns:a16="http://schemas.microsoft.com/office/drawing/2014/main" xmlns="" id="{8CC8AFC9-2394-FA4D-997A-E88CEA272745}"/>
               </a:ext>
             </a:extLst>
           </p:cNvPr>
@@ -2069,7 +2520,7 @@
           <a:p>
             <a:fld id="{53326AB7-C146-8643-AC32-1D896C71A7F3}" type="datetimeFigureOut">
               <a:rPr lang="en-US" smtClean="0"/>
-              <a:t>7/21/18</a:t>
+              <a:t>7/23/18</a:t>
             </a:fld>
             <a:endParaRPr lang="en-US"/>
           </a:p>
@@ -2080,7 +2531,7 @@
           <p:cNvPr id="3" name="Footer Placeholder 2">
             <a:extLst>
               <a:ext uri="{FF2B5EF4-FFF2-40B4-BE49-F238E27FC236}">
-                <a16:creationId xmlns:a16="http://schemas.microsoft.com/office/drawing/2014/main" id="{65E573A5-1335-AE42-BF09-1FCBDAAF3B1B}"/>
+                <a16:creationId xmlns:a16="http://schemas.microsoft.com/office/drawing/2014/main" xmlns="" id="{65E573A5-1335-AE42-BF09-1FCBDAAF3B1B}"/>
               </a:ext>
             </a:extLst>
           </p:cNvPr>
@@ -2105,7 +2556,7 @@
           <p:cNvPr id="4" name="Slide Number Placeholder 3">
             <a:extLst>
               <a:ext uri="{FF2B5EF4-FFF2-40B4-BE49-F238E27FC236}">
-                <a16:creationId xmlns:a16="http://schemas.microsoft.com/office/drawing/2014/main" id="{AFA33E51-7F7D-CE46-8B95-7568215B7AE1}"/>
+                <a16:creationId xmlns:a16="http://schemas.microsoft.com/office/drawing/2014/main" xmlns="" id="{AFA33E51-7F7D-CE46-8B95-7568215B7AE1}"/>
               </a:ext>
             </a:extLst>
           </p:cNvPr>
@@ -2164,7 +2615,7 @@
           <p:cNvPr id="2" name="Title 1">
             <a:extLst>
               <a:ext uri="{FF2B5EF4-FFF2-40B4-BE49-F238E27FC236}">
-                <a16:creationId xmlns:a16="http://schemas.microsoft.com/office/drawing/2014/main" id="{202548E5-E07D-1743-B852-D6ECD31088CD}"/>
+                <a16:creationId xmlns:a16="http://schemas.microsoft.com/office/drawing/2014/main" xmlns="" id="{202548E5-E07D-1743-B852-D6ECD31088CD}"/>
               </a:ext>
             </a:extLst>
           </p:cNvPr>
@@ -2201,7 +2652,7 @@
           <p:cNvPr id="3" name="Content Placeholder 2">
             <a:extLst>
               <a:ext uri="{FF2B5EF4-FFF2-40B4-BE49-F238E27FC236}">
-                <a16:creationId xmlns:a16="http://schemas.microsoft.com/office/drawing/2014/main" id="{75EEBEEA-F298-024B-95FB-9C751B77EB4A}"/>
+                <a16:creationId xmlns:a16="http://schemas.microsoft.com/office/drawing/2014/main" xmlns="" id="{75EEBEEA-F298-024B-95FB-9C751B77EB4A}"/>
               </a:ext>
             </a:extLst>
           </p:cNvPr>
@@ -2291,7 +2742,7 @@
           <p:cNvPr id="4" name="Text Placeholder 3">
             <a:extLst>
               <a:ext uri="{FF2B5EF4-FFF2-40B4-BE49-F238E27FC236}">
-                <a16:creationId xmlns:a16="http://schemas.microsoft.com/office/drawing/2014/main" id="{3506EB14-9D0B-2648-B3DB-11824B88BEFB}"/>
+                <a16:creationId xmlns:a16="http://schemas.microsoft.com/office/drawing/2014/main" xmlns="" id="{3506EB14-9D0B-2648-B3DB-11824B88BEFB}"/>
               </a:ext>
             </a:extLst>
           </p:cNvPr>
@@ -2362,7 +2813,7 @@
           <p:cNvPr id="5" name="Date Placeholder 4">
             <a:extLst>
               <a:ext uri="{FF2B5EF4-FFF2-40B4-BE49-F238E27FC236}">
-                <a16:creationId xmlns:a16="http://schemas.microsoft.com/office/drawing/2014/main" id="{32976687-76B2-4140-83AC-8536F4E951D6}"/>
+                <a16:creationId xmlns:a16="http://schemas.microsoft.com/office/drawing/2014/main" xmlns="" id="{32976687-76B2-4140-83AC-8536F4E951D6}"/>
               </a:ext>
             </a:extLst>
           </p:cNvPr>
@@ -2380,7 +2831,7 @@
           <a:p>
             <a:fld id="{53326AB7-C146-8643-AC32-1D896C71A7F3}" type="datetimeFigureOut">
               <a:rPr lang="en-US" smtClean="0"/>
-              <a:t>7/21/18</a:t>
+              <a:t>7/23/18</a:t>
             </a:fld>
             <a:endParaRPr lang="en-US"/>
           </a:p>
@@ -2391,7 +2842,7 @@
           <p:cNvPr id="6" name="Footer Placeholder 5">
             <a:extLst>
               <a:ext uri="{FF2B5EF4-FFF2-40B4-BE49-F238E27FC236}">
-                <a16:creationId xmlns:a16="http://schemas.microsoft.com/office/drawing/2014/main" id="{48A96F32-9D50-C041-B009-75800376ADBA}"/>
+                <a16:creationId xmlns:a16="http://schemas.microsoft.com/office/drawing/2014/main" xmlns="" id="{48A96F32-9D50-C041-B009-75800376ADBA}"/>
               </a:ext>
             </a:extLst>
           </p:cNvPr>
@@ -2416,7 +2867,7 @@
           <p:cNvPr id="7" name="Slide Number Placeholder 6">
             <a:extLst>
               <a:ext uri="{FF2B5EF4-FFF2-40B4-BE49-F238E27FC236}">
-                <a16:creationId xmlns:a16="http://schemas.microsoft.com/office/drawing/2014/main" id="{EF2142CE-848C-BD4E-8A40-32AB7BD028CF}"/>
+                <a16:creationId xmlns:a16="http://schemas.microsoft.com/office/drawing/2014/main" xmlns="" id="{EF2142CE-848C-BD4E-8A40-32AB7BD028CF}"/>
               </a:ext>
             </a:extLst>
           </p:cNvPr>
@@ -2475,7 +2926,7 @@
           <p:cNvPr id="2" name="Title 1">
             <a:extLst>
               <a:ext uri="{FF2B5EF4-FFF2-40B4-BE49-F238E27FC236}">
-                <a16:creationId xmlns:a16="http://schemas.microsoft.com/office/drawing/2014/main" id="{663299C7-4255-864E-8B0F-406D4E839B1D}"/>
+                <a16:creationId xmlns:a16="http://schemas.microsoft.com/office/drawing/2014/main" xmlns="" id="{663299C7-4255-864E-8B0F-406D4E839B1D}"/>
               </a:ext>
             </a:extLst>
           </p:cNvPr>
@@ -2512,7 +2963,7 @@
           <p:cNvPr id="3" name="Picture Placeholder 2">
             <a:extLst>
               <a:ext uri="{FF2B5EF4-FFF2-40B4-BE49-F238E27FC236}">
-                <a16:creationId xmlns:a16="http://schemas.microsoft.com/office/drawing/2014/main" id="{755CA03A-A409-8347-90BF-5F664DFFD557}"/>
+                <a16:creationId xmlns:a16="http://schemas.microsoft.com/office/drawing/2014/main" xmlns="" id="{755CA03A-A409-8347-90BF-5F664DFFD557}"/>
               </a:ext>
             </a:extLst>
           </p:cNvPr>
@@ -2579,7 +3030,7 @@
           <p:cNvPr id="4" name="Text Placeholder 3">
             <a:extLst>
               <a:ext uri="{FF2B5EF4-FFF2-40B4-BE49-F238E27FC236}">
-                <a16:creationId xmlns:a16="http://schemas.microsoft.com/office/drawing/2014/main" id="{5FB50B80-F53D-A846-921D-8A929C4D1910}"/>
+                <a16:creationId xmlns:a16="http://schemas.microsoft.com/office/drawing/2014/main" xmlns="" id="{5FB50B80-F53D-A846-921D-8A929C4D1910}"/>
               </a:ext>
             </a:extLst>
           </p:cNvPr>
@@ -2650,7 +3101,7 @@
           <p:cNvPr id="5" name="Date Placeholder 4">
             <a:extLst>
               <a:ext uri="{FF2B5EF4-FFF2-40B4-BE49-F238E27FC236}">
-                <a16:creationId xmlns:a16="http://schemas.microsoft.com/office/drawing/2014/main" id="{7256D389-B843-E349-8890-DA1714FA9731}"/>
+                <a16:creationId xmlns:a16="http://schemas.microsoft.com/office/drawing/2014/main" xmlns="" id="{7256D389-B843-E349-8890-DA1714FA9731}"/>
               </a:ext>
             </a:extLst>
           </p:cNvPr>
@@ -2668,7 +3119,7 @@
           <a:p>
             <a:fld id="{53326AB7-C146-8643-AC32-1D896C71A7F3}" type="datetimeFigureOut">
               <a:rPr lang="en-US" smtClean="0"/>
-              <a:t>7/21/18</a:t>
+              <a:t>7/23/18</a:t>
             </a:fld>
             <a:endParaRPr lang="en-US"/>
           </a:p>
@@ -2679,7 +3130,7 @@
           <p:cNvPr id="6" name="Footer Placeholder 5">
             <a:extLst>
               <a:ext uri="{FF2B5EF4-FFF2-40B4-BE49-F238E27FC236}">
-                <a16:creationId xmlns:a16="http://schemas.microsoft.com/office/drawing/2014/main" id="{3F7AB3BD-8BDF-0E40-A12B-116E42619796}"/>
+                <a16:creationId xmlns:a16="http://schemas.microsoft.com/office/drawing/2014/main" xmlns="" id="{3F7AB3BD-8BDF-0E40-A12B-116E42619796}"/>
               </a:ext>
             </a:extLst>
           </p:cNvPr>
@@ -2704,7 +3155,7 @@
           <p:cNvPr id="7" name="Slide Number Placeholder 6">
             <a:extLst>
               <a:ext uri="{FF2B5EF4-FFF2-40B4-BE49-F238E27FC236}">
-                <a16:creationId xmlns:a16="http://schemas.microsoft.com/office/drawing/2014/main" id="{43131EEB-3496-6746-BF21-5BF059F85A04}"/>
+                <a16:creationId xmlns:a16="http://schemas.microsoft.com/office/drawing/2014/main" xmlns="" id="{43131EEB-3496-6746-BF21-5BF059F85A04}"/>
               </a:ext>
             </a:extLst>
           </p:cNvPr>
@@ -2768,7 +3219,7 @@
           <p:cNvPr id="2" name="Title Placeholder 1">
             <a:extLst>
               <a:ext uri="{FF2B5EF4-FFF2-40B4-BE49-F238E27FC236}">
-                <a16:creationId xmlns:a16="http://schemas.microsoft.com/office/drawing/2014/main" id="{8D6B2A93-86B7-724F-A8E8-70A991C762E5}"/>
+                <a16:creationId xmlns:a16="http://schemas.microsoft.com/office/drawing/2014/main" xmlns="" id="{8D6B2A93-86B7-724F-A8E8-70A991C762E5}"/>
               </a:ext>
             </a:extLst>
           </p:cNvPr>
@@ -2806,7 +3257,7 @@
           <p:cNvPr id="3" name="Text Placeholder 2">
             <a:extLst>
               <a:ext uri="{FF2B5EF4-FFF2-40B4-BE49-F238E27FC236}">
-                <a16:creationId xmlns:a16="http://schemas.microsoft.com/office/drawing/2014/main" id="{C63B9F64-2C6A-CE48-AB9D-FB7CE414B3B8}"/>
+                <a16:creationId xmlns:a16="http://schemas.microsoft.com/office/drawing/2014/main" xmlns="" id="{C63B9F64-2C6A-CE48-AB9D-FB7CE414B3B8}"/>
               </a:ext>
             </a:extLst>
           </p:cNvPr>
@@ -2873,7 +3324,7 @@
           <p:cNvPr id="4" name="Date Placeholder 3">
             <a:extLst>
               <a:ext uri="{FF2B5EF4-FFF2-40B4-BE49-F238E27FC236}">
-                <a16:creationId xmlns:a16="http://schemas.microsoft.com/office/drawing/2014/main" id="{2AEB4216-D3B6-004E-8D9D-33472814619C}"/>
+                <a16:creationId xmlns:a16="http://schemas.microsoft.com/office/drawing/2014/main" xmlns="" id="{2AEB4216-D3B6-004E-8D9D-33472814619C}"/>
               </a:ext>
             </a:extLst>
           </p:cNvPr>
@@ -2909,7 +3360,7 @@
           <a:p>
             <a:fld id="{53326AB7-C146-8643-AC32-1D896C71A7F3}" type="datetimeFigureOut">
               <a:rPr lang="en-US" smtClean="0"/>
-              <a:t>7/21/18</a:t>
+              <a:t>7/23/18</a:t>
             </a:fld>
             <a:endParaRPr lang="en-US"/>
           </a:p>
@@ -2920,7 +3371,7 @@
           <p:cNvPr id="5" name="Footer Placeholder 4">
             <a:extLst>
               <a:ext uri="{FF2B5EF4-FFF2-40B4-BE49-F238E27FC236}">
-                <a16:creationId xmlns:a16="http://schemas.microsoft.com/office/drawing/2014/main" id="{6B9742FF-E815-B64D-B6D5-E2973185BE84}"/>
+                <a16:creationId xmlns:a16="http://schemas.microsoft.com/office/drawing/2014/main" xmlns="" id="{6B9742FF-E815-B64D-B6D5-E2973185BE84}"/>
               </a:ext>
             </a:extLst>
           </p:cNvPr>
@@ -2963,7 +3414,7 @@
           <p:cNvPr id="6" name="Slide Number Placeholder 5">
             <a:extLst>
               <a:ext uri="{FF2B5EF4-FFF2-40B4-BE49-F238E27FC236}">
-                <a16:creationId xmlns:a16="http://schemas.microsoft.com/office/drawing/2014/main" id="{1104E5B1-99C5-FF4A-8E8B-D292DC7708C2}"/>
+                <a16:creationId xmlns:a16="http://schemas.microsoft.com/office/drawing/2014/main" xmlns="" id="{1104E5B1-99C5-FF4A-8E8B-D292DC7708C2}"/>
               </a:ext>
             </a:extLst>
           </p:cNvPr>
@@ -3331,7 +3782,7 @@
           <p:cNvPr id="2" name="Title 1">
             <a:extLst>
               <a:ext uri="{FF2B5EF4-FFF2-40B4-BE49-F238E27FC236}">
-                <a16:creationId xmlns:a16="http://schemas.microsoft.com/office/drawing/2014/main" id="{4FC54A01-461C-1045-AC9B-35DD625CB021}"/>
+                <a16:creationId xmlns:a16="http://schemas.microsoft.com/office/drawing/2014/main" xmlns="" id="{4FC54A01-461C-1045-AC9B-35DD625CB021}"/>
               </a:ext>
             </a:extLst>
           </p:cNvPr>
@@ -3349,8 +3800,13 @@
           <a:p>
             <a:r>
               <a:rPr lang="en-US" dirty="0"/>
-              <a:t>Chapter 9</a:t>
-            </a:r>
+              <a:t>Chapter </a:t>
+            </a:r>
+            <a:r>
+              <a:rPr lang="en-US" dirty="0" smtClean="0"/>
+              <a:t>9</a:t>
+            </a:r>
+            <a:endParaRPr lang="en-US" dirty="0"/>
           </a:p>
         </p:txBody>
       </p:sp>
@@ -3359,7 +3815,7 @@
           <p:cNvPr id="3" name="Subtitle 2">
             <a:extLst>
               <a:ext uri="{FF2B5EF4-FFF2-40B4-BE49-F238E27FC236}">
-                <a16:creationId xmlns:a16="http://schemas.microsoft.com/office/drawing/2014/main" id="{1F6A411C-5F1C-D542-A211-0F0D7F10FA53}"/>
+                <a16:creationId xmlns:a16="http://schemas.microsoft.com/office/drawing/2014/main" xmlns="" id="{1F6A411C-5F1C-D542-A211-0F0D7F10FA53}"/>
               </a:ext>
             </a:extLst>
           </p:cNvPr>
@@ -3376,9 +3832,10 @@
           <a:lstStyle/>
           <a:p>
             <a:r>
-              <a:rPr lang="en-US"/>
+              <a:rPr lang="en-US" dirty="0" smtClean="0"/>
               <a:t>Spatial Statistics</a:t>
             </a:r>
+            <a:endParaRPr lang="en-US" dirty="0"/>
           </a:p>
         </p:txBody>
       </p:sp>
@@ -3386,6 +3843,86 @@
     <p:extLst>
       <p:ext uri="{BB962C8B-B14F-4D97-AF65-F5344CB8AC3E}">
         <p14:creationId xmlns:p14="http://schemas.microsoft.com/office/powerpoint/2010/main" val="27190754"/>
+      </p:ext>
+    </p:extLst>
+  </p:cSld>
+  <p:clrMapOvr>
+    <a:masterClrMapping/>
+  </p:clrMapOvr>
+</p:sld>
+</file>
+
+<file path=ppt/slides/slide2.xml><?xml version="1.0" encoding="utf-8"?>
+<p:sld xmlns:a="http://schemas.openxmlformats.org/drawingml/2006/main" xmlns:r="http://schemas.openxmlformats.org/officeDocument/2006/relationships" xmlns:p="http://schemas.openxmlformats.org/presentationml/2006/main">
+  <p:cSld>
+    <p:spTree>
+      <p:nvGrpSpPr>
+        <p:cNvPr id="1" name=""/>
+        <p:cNvGrpSpPr/>
+        <p:nvPr/>
+      </p:nvGrpSpPr>
+      <p:grpSpPr>
+        <a:xfrm>
+          <a:off x="0" y="0"/>
+          <a:ext cx="0" cy="0"/>
+          <a:chOff x="0" y="0"/>
+          <a:chExt cx="0" cy="0"/>
+        </a:xfrm>
+      </p:grpSpPr>
+      <p:sp>
+        <p:nvSpPr>
+          <p:cNvPr id="2" name="Title 1">
+            <a:extLst>
+              <a:ext uri="{FF2B5EF4-FFF2-40B4-BE49-F238E27FC236}">
+                <a16:creationId xmlns:a16="http://schemas.microsoft.com/office/drawing/2014/main" xmlns="" id="{4B2C1829-4EA1-1244-8508-CE1A389E5469}"/>
+              </a:ext>
+            </a:extLst>
+          </p:cNvPr>
+          <p:cNvSpPr>
+            <a:spLocks noGrp="1"/>
+          </p:cNvSpPr>
+          <p:nvPr>
+            <p:ph type="title"/>
+          </p:nvPr>
+        </p:nvSpPr>
+        <p:spPr/>
+        <p:txBody>
+          <a:bodyPr/>
+          <a:lstStyle/>
+          <a:p>
+            <a:endParaRPr lang="en-US"/>
+          </a:p>
+        </p:txBody>
+      </p:sp>
+      <p:sp>
+        <p:nvSpPr>
+          <p:cNvPr id="3" name="Content Placeholder 2">
+            <a:extLst>
+              <a:ext uri="{FF2B5EF4-FFF2-40B4-BE49-F238E27FC236}">
+                <a16:creationId xmlns:a16="http://schemas.microsoft.com/office/drawing/2014/main" xmlns="" id="{F10B2661-613E-4D49-8D8F-08C27398FC24}"/>
+              </a:ext>
+            </a:extLst>
+          </p:cNvPr>
+          <p:cNvSpPr>
+            <a:spLocks noGrp="1"/>
+          </p:cNvSpPr>
+          <p:nvPr>
+            <p:ph idx="1"/>
+          </p:nvPr>
+        </p:nvSpPr>
+        <p:spPr/>
+        <p:txBody>
+          <a:bodyPr/>
+          <a:lstStyle/>
+          <a:p>
+            <a:endParaRPr lang="en-US"/>
+          </a:p>
+        </p:txBody>
+      </p:sp>
+    </p:spTree>
+    <p:extLst>
+      <p:ext uri="{BB962C8B-B14F-4D97-AF65-F5344CB8AC3E}">
+        <p14:creationId xmlns:p14="http://schemas.microsoft.com/office/powerpoint/2010/main" val="1266398697"/>
       </p:ext>
     </p:extLst>
   </p:cSld>
@@ -3688,4 +4225,299 @@
     </a:ext>
   </a:extLst>
 </a:theme>
+</file>
+
+<file path=ppt/theme/theme2.xml><?xml version="1.0" encoding="utf-8"?>
+<a:theme xmlns:a="http://schemas.openxmlformats.org/drawingml/2006/main" name="Office Theme">
+  <a:themeElements>
+    <a:clrScheme name="Office">
+      <a:dk1>
+        <a:sysClr val="windowText" lastClr="000000"/>
+      </a:dk1>
+      <a:lt1>
+        <a:sysClr val="window" lastClr="FFFFFF"/>
+      </a:lt1>
+      <a:dk2>
+        <a:srgbClr val="44546A"/>
+      </a:dk2>
+      <a:lt2>
+        <a:srgbClr val="E7E6E6"/>
+      </a:lt2>
+      <a:accent1>
+        <a:srgbClr val="4472C4"/>
+      </a:accent1>
+      <a:accent2>
+        <a:srgbClr val="ED7D31"/>
+      </a:accent2>
+      <a:accent3>
+        <a:srgbClr val="A5A5A5"/>
+      </a:accent3>
+      <a:accent4>
+        <a:srgbClr val="FFC000"/>
+      </a:accent4>
+      <a:accent5>
+        <a:srgbClr val="5B9BD5"/>
+      </a:accent5>
+      <a:accent6>
+        <a:srgbClr val="70AD47"/>
+      </a:accent6>
+      <a:hlink>
+        <a:srgbClr val="0563C1"/>
+      </a:hlink>
+      <a:folHlink>
+        <a:srgbClr val="954F72"/>
+      </a:folHlink>
+    </a:clrScheme>
+    <a:fontScheme name="Office">
+      <a:majorFont>
+        <a:latin typeface="Calibri Light" panose="020F0302020204030204"/>
+        <a:ea typeface=""/>
+        <a:cs typeface=""/>
+        <a:font script="Jpan" typeface="游ゴシック Light"/>
+        <a:font script="Hang" typeface="맑은 고딕"/>
+        <a:font script="Hans" typeface="等线 Light"/>
+        <a:font script="Hant" typeface="新細明體"/>
+        <a:font script="Arab" typeface="Times New Roman"/>
+        <a:font script="Hebr" typeface="Times New Roman"/>
+        <a:font script="Thai" typeface="Angsana New"/>
+        <a:font script="Ethi" typeface="Nyala"/>
+        <a:font script="Beng" typeface="Vrinda"/>
+        <a:font script="Gujr" typeface="Shruti"/>
+        <a:font script="Khmr" typeface="MoolBoran"/>
+        <a:font script="Knda" typeface="Tunga"/>
+        <a:font script="Guru" typeface="Raavi"/>
+        <a:font script="Cans" typeface="Euphemia"/>
+        <a:font script="Cher" typeface="Plantagenet Cherokee"/>
+        <a:font script="Yiii" typeface="Microsoft Yi Baiti"/>
+        <a:font script="Tibt" typeface="Microsoft Himalaya"/>
+        <a:font script="Thaa" typeface="MV Boli"/>
+        <a:font script="Deva" typeface="Mangal"/>
+        <a:font script="Telu" typeface="Gautami"/>
+        <a:font script="Taml" typeface="Latha"/>
+        <a:font script="Syrc" typeface="Estrangelo Edessa"/>
+        <a:font script="Orya" typeface="Kalinga"/>
+        <a:font script="Mlym" typeface="Kartika"/>
+        <a:font script="Laoo" typeface="DokChampa"/>
+        <a:font script="Sinh" typeface="Iskoola Pota"/>
+        <a:font script="Mong" typeface="Mongolian Baiti"/>
+        <a:font script="Viet" typeface="Times New Roman"/>
+        <a:font script="Uigh" typeface="Microsoft Uighur"/>
+        <a:font script="Geor" typeface="Sylfaen"/>
+        <a:font script="Armn" typeface="Arial"/>
+        <a:font script="Bugi" typeface="Leelawadee UI"/>
+        <a:font script="Bopo" typeface="Microsoft JhengHei"/>
+        <a:font script="Java" typeface="Javanese Text"/>
+        <a:font script="Lisu" typeface="Segoe UI"/>
+        <a:font script="Mymr" typeface="Myanmar Text"/>
+        <a:font script="Nkoo" typeface="Ebrima"/>
+        <a:font script="Olck" typeface="Nirmala UI"/>
+        <a:font script="Osma" typeface="Ebrima"/>
+        <a:font script="Phag" typeface="Phagspa"/>
+        <a:font script="Syrn" typeface="Estrangelo Edessa"/>
+        <a:font script="Syrj" typeface="Estrangelo Edessa"/>
+        <a:font script="Syre" typeface="Estrangelo Edessa"/>
+        <a:font script="Sora" typeface="Nirmala UI"/>
+        <a:font script="Tale" typeface="Microsoft Tai Le"/>
+        <a:font script="Talu" typeface="Microsoft New Tai Lue"/>
+        <a:font script="Tfng" typeface="Ebrima"/>
+      </a:majorFont>
+      <a:minorFont>
+        <a:latin typeface="Calibri" panose="020F0502020204030204"/>
+        <a:ea typeface=""/>
+        <a:cs typeface=""/>
+        <a:font script="Jpan" typeface="游ゴシック"/>
+        <a:font script="Hang" typeface="맑은 고딕"/>
+        <a:font script="Hans" typeface="等线"/>
+        <a:font script="Hant" typeface="新細明體"/>
+        <a:font script="Arab" typeface="Arial"/>
+        <a:font script="Hebr" typeface="Arial"/>
+        <a:font script="Thai" typeface="Cordia New"/>
+        <a:font script="Ethi" typeface="Nyala"/>
+        <a:font script="Beng" typeface="Vrinda"/>
+        <a:font script="Gujr" typeface="Shruti"/>
+        <a:font script="Khmr" typeface="DaunPenh"/>
+        <a:font script="Knda" typeface="Tunga"/>
+        <a:font script="Guru" typeface="Raavi"/>
+        <a:font script="Cans" typeface="Euphemia"/>
+        <a:font script="Cher" typeface="Plantagenet Cherokee"/>
+        <a:font script="Yiii" typeface="Microsoft Yi Baiti"/>
+        <a:font script="Tibt" typeface="Microsoft Himalaya"/>
+        <a:font script="Thaa" typeface="MV Boli"/>
+        <a:font script="Deva" typeface="Mangal"/>
+        <a:font script="Telu" typeface="Gautami"/>
+        <a:font script="Taml" typeface="Latha"/>
+        <a:font script="Syrc" typeface="Estrangelo Edessa"/>
+        <a:font script="Orya" typeface="Kalinga"/>
+        <a:font script="Mlym" typeface="Kartika"/>
+        <a:font script="Laoo" typeface="DokChampa"/>
+        <a:font script="Sinh" typeface="Iskoola Pota"/>
+        <a:font script="Mong" typeface="Mongolian Baiti"/>
+        <a:font script="Viet" typeface="Arial"/>
+        <a:font script="Uigh" typeface="Microsoft Uighur"/>
+        <a:font script="Geor" typeface="Sylfaen"/>
+        <a:font script="Armn" typeface="Arial"/>
+        <a:font script="Bugi" typeface="Leelawadee UI"/>
+        <a:font script="Bopo" typeface="Microsoft JhengHei"/>
+        <a:font script="Java" typeface="Javanese Text"/>
+        <a:font script="Lisu" typeface="Segoe UI"/>
+        <a:font script="Mymr" typeface="Myanmar Text"/>
+        <a:font script="Nkoo" typeface="Ebrima"/>
+        <a:font script="Olck" typeface="Nirmala UI"/>
+        <a:font script="Osma" typeface="Ebrima"/>
+        <a:font script="Phag" typeface="Phagspa"/>
+        <a:font script="Syrn" typeface="Estrangelo Edessa"/>
+        <a:font script="Syrj" typeface="Estrangelo Edessa"/>
+        <a:font script="Syre" typeface="Estrangelo Edessa"/>
+        <a:font script="Sora" typeface="Nirmala UI"/>
+        <a:font script="Tale" typeface="Microsoft Tai Le"/>
+        <a:font script="Talu" typeface="Microsoft New Tai Lue"/>
+        <a:font script="Tfng" typeface="Ebrima"/>
+      </a:minorFont>
+    </a:fontScheme>
+    <a:fmtScheme name="Office">
+      <a:fillStyleLst>
+        <a:solidFill>
+          <a:schemeClr val="phClr"/>
+        </a:solidFill>
+        <a:gradFill rotWithShape="1">
+          <a:gsLst>
+            <a:gs pos="0">
+              <a:schemeClr val="phClr">
+                <a:lumMod val="110000"/>
+                <a:satMod val="105000"/>
+                <a:tint val="67000"/>
+              </a:schemeClr>
+            </a:gs>
+            <a:gs pos="50000">
+              <a:schemeClr val="phClr">
+                <a:lumMod val="105000"/>
+                <a:satMod val="103000"/>
+                <a:tint val="73000"/>
+              </a:schemeClr>
+            </a:gs>
+            <a:gs pos="100000">
+              <a:schemeClr val="phClr">
+                <a:lumMod val="105000"/>
+                <a:satMod val="109000"/>
+                <a:tint val="81000"/>
+              </a:schemeClr>
+            </a:gs>
+          </a:gsLst>
+          <a:lin ang="5400000" scaled="0"/>
+        </a:gradFill>
+        <a:gradFill rotWithShape="1">
+          <a:gsLst>
+            <a:gs pos="0">
+              <a:schemeClr val="phClr">
+                <a:satMod val="103000"/>
+                <a:lumMod val="102000"/>
+                <a:tint val="94000"/>
+              </a:schemeClr>
+            </a:gs>
+            <a:gs pos="50000">
+              <a:schemeClr val="phClr">
+                <a:satMod val="110000"/>
+                <a:lumMod val="100000"/>
+                <a:shade val="100000"/>
+              </a:schemeClr>
+            </a:gs>
+            <a:gs pos="100000">
+              <a:schemeClr val="phClr">
+                <a:lumMod val="99000"/>
+                <a:satMod val="120000"/>
+                <a:shade val="78000"/>
+              </a:schemeClr>
+            </a:gs>
+          </a:gsLst>
+          <a:lin ang="5400000" scaled="0"/>
+        </a:gradFill>
+      </a:fillStyleLst>
+      <a:lnStyleLst>
+        <a:ln w="6350" cap="flat" cmpd="sng" algn="ctr">
+          <a:solidFill>
+            <a:schemeClr val="phClr"/>
+          </a:solidFill>
+          <a:prstDash val="solid"/>
+          <a:miter lim="800000"/>
+        </a:ln>
+        <a:ln w="12700" cap="flat" cmpd="sng" algn="ctr">
+          <a:solidFill>
+            <a:schemeClr val="phClr"/>
+          </a:solidFill>
+          <a:prstDash val="solid"/>
+          <a:miter lim="800000"/>
+        </a:ln>
+        <a:ln w="19050" cap="flat" cmpd="sng" algn="ctr">
+          <a:solidFill>
+            <a:schemeClr val="phClr"/>
+          </a:solidFill>
+          <a:prstDash val="solid"/>
+          <a:miter lim="800000"/>
+        </a:ln>
+      </a:lnStyleLst>
+      <a:effectStyleLst>
+        <a:effectStyle>
+          <a:effectLst/>
+        </a:effectStyle>
+        <a:effectStyle>
+          <a:effectLst/>
+        </a:effectStyle>
+        <a:effectStyle>
+          <a:effectLst>
+            <a:outerShdw blurRad="57150" dist="19050" dir="5400000" algn="ctr" rotWithShape="0">
+              <a:srgbClr val="000000">
+                <a:alpha val="63000"/>
+              </a:srgbClr>
+            </a:outerShdw>
+          </a:effectLst>
+        </a:effectStyle>
+      </a:effectStyleLst>
+      <a:bgFillStyleLst>
+        <a:solidFill>
+          <a:schemeClr val="phClr"/>
+        </a:solidFill>
+        <a:solidFill>
+          <a:schemeClr val="phClr">
+            <a:tint val="95000"/>
+            <a:satMod val="170000"/>
+          </a:schemeClr>
+        </a:solidFill>
+        <a:gradFill rotWithShape="1">
+          <a:gsLst>
+            <a:gs pos="0">
+              <a:schemeClr val="phClr">
+                <a:tint val="93000"/>
+                <a:satMod val="150000"/>
+                <a:shade val="98000"/>
+                <a:lumMod val="102000"/>
+              </a:schemeClr>
+            </a:gs>
+            <a:gs pos="50000">
+              <a:schemeClr val="phClr">
+                <a:tint val="98000"/>
+                <a:satMod val="130000"/>
+                <a:shade val="90000"/>
+                <a:lumMod val="103000"/>
+              </a:schemeClr>
+            </a:gs>
+            <a:gs pos="100000">
+              <a:schemeClr val="phClr">
+                <a:shade val="63000"/>
+                <a:satMod val="120000"/>
+              </a:schemeClr>
+            </a:gs>
+          </a:gsLst>
+          <a:lin ang="5400000" scaled="0"/>
+        </a:gradFill>
+      </a:bgFillStyleLst>
+    </a:fmtScheme>
+  </a:themeElements>
+  <a:objectDefaults/>
+  <a:extraClrSchemeLst/>
+  <a:extLst>
+    <a:ext uri="{05A4C25C-085E-4340-85A3-A5531E510DB2}">
+      <thm15:themeFamily xmlns:thm15="http://schemas.microsoft.com/office/thememl/2012/main" name="Office Theme" id="{62F939B6-93AF-4DB8-9C6B-D6C7DFDC589F}" vid="{4A3C46E8-61CC-4603-A589-7422A47A8E4A}"/>
+    </a:ext>
+  </a:extLst>
+</a:theme>
 </file>
</xml_diff>